<commit_message>
Ajout de recherche des plages d'hyperparamètres
</commit_message>
<xml_diff>
--- a/report/classes.pptx
+++ b/report/classes.pptx
@@ -261,7 +261,7 @@
           <a:p>
             <a:fld id="{CC7E22F1-513A-4759-99EA-E075E3F80EEB}" type="datetimeFigureOut">
               <a:rPr lang="fr-CA" smtClean="0"/>
-              <a:t>2020-12-13</a:t>
+              <a:t>2020-12-14</a:t>
             </a:fld>
             <a:endParaRPr lang="fr-CA"/>
           </a:p>
@@ -461,7 +461,7 @@
           <a:p>
             <a:fld id="{CC7E22F1-513A-4759-99EA-E075E3F80EEB}" type="datetimeFigureOut">
               <a:rPr lang="fr-CA" smtClean="0"/>
-              <a:t>2020-12-13</a:t>
+              <a:t>2020-12-14</a:t>
             </a:fld>
             <a:endParaRPr lang="fr-CA"/>
           </a:p>
@@ -671,7 +671,7 @@
           <a:p>
             <a:fld id="{CC7E22F1-513A-4759-99EA-E075E3F80EEB}" type="datetimeFigureOut">
               <a:rPr lang="fr-CA" smtClean="0"/>
-              <a:t>2020-12-13</a:t>
+              <a:t>2020-12-14</a:t>
             </a:fld>
             <a:endParaRPr lang="fr-CA"/>
           </a:p>
@@ -871,7 +871,7 @@
           <a:p>
             <a:fld id="{CC7E22F1-513A-4759-99EA-E075E3F80EEB}" type="datetimeFigureOut">
               <a:rPr lang="fr-CA" smtClean="0"/>
-              <a:t>2020-12-13</a:t>
+              <a:t>2020-12-14</a:t>
             </a:fld>
             <a:endParaRPr lang="fr-CA"/>
           </a:p>
@@ -1147,7 +1147,7 @@
           <a:p>
             <a:fld id="{CC7E22F1-513A-4759-99EA-E075E3F80EEB}" type="datetimeFigureOut">
               <a:rPr lang="fr-CA" smtClean="0"/>
-              <a:t>2020-12-13</a:t>
+              <a:t>2020-12-14</a:t>
             </a:fld>
             <a:endParaRPr lang="fr-CA"/>
           </a:p>
@@ -1415,7 +1415,7 @@
           <a:p>
             <a:fld id="{CC7E22F1-513A-4759-99EA-E075E3F80EEB}" type="datetimeFigureOut">
               <a:rPr lang="fr-CA" smtClean="0"/>
-              <a:t>2020-12-13</a:t>
+              <a:t>2020-12-14</a:t>
             </a:fld>
             <a:endParaRPr lang="fr-CA"/>
           </a:p>
@@ -1830,7 +1830,7 @@
           <a:p>
             <a:fld id="{CC7E22F1-513A-4759-99EA-E075E3F80EEB}" type="datetimeFigureOut">
               <a:rPr lang="fr-CA" smtClean="0"/>
-              <a:t>2020-12-13</a:t>
+              <a:t>2020-12-14</a:t>
             </a:fld>
             <a:endParaRPr lang="fr-CA"/>
           </a:p>
@@ -1972,7 +1972,7 @@
           <a:p>
             <a:fld id="{CC7E22F1-513A-4759-99EA-E075E3F80EEB}" type="datetimeFigureOut">
               <a:rPr lang="fr-CA" smtClean="0"/>
-              <a:t>2020-12-13</a:t>
+              <a:t>2020-12-14</a:t>
             </a:fld>
             <a:endParaRPr lang="fr-CA"/>
           </a:p>
@@ -2085,7 +2085,7 @@
           <a:p>
             <a:fld id="{CC7E22F1-513A-4759-99EA-E075E3F80EEB}" type="datetimeFigureOut">
               <a:rPr lang="fr-CA" smtClean="0"/>
-              <a:t>2020-12-13</a:t>
+              <a:t>2020-12-14</a:t>
             </a:fld>
             <a:endParaRPr lang="fr-CA"/>
           </a:p>
@@ -2398,7 +2398,7 @@
           <a:p>
             <a:fld id="{CC7E22F1-513A-4759-99EA-E075E3F80EEB}" type="datetimeFigureOut">
               <a:rPr lang="fr-CA" smtClean="0"/>
-              <a:t>2020-12-13</a:t>
+              <a:t>2020-12-14</a:t>
             </a:fld>
             <a:endParaRPr lang="fr-CA"/>
           </a:p>
@@ -2687,7 +2687,7 @@
           <a:p>
             <a:fld id="{CC7E22F1-513A-4759-99EA-E075E3F80EEB}" type="datetimeFigureOut">
               <a:rPr lang="fr-CA" smtClean="0"/>
-              <a:t>2020-12-13</a:t>
+              <a:t>2020-12-14</a:t>
             </a:fld>
             <a:endParaRPr lang="fr-CA"/>
           </a:p>
@@ -2930,7 +2930,7 @@
           <a:p>
             <a:fld id="{CC7E22F1-513A-4759-99EA-E075E3F80EEB}" type="datetimeFigureOut">
               <a:rPr lang="fr-CA" smtClean="0"/>
-              <a:t>2020-12-13</a:t>
+              <a:t>2020-12-14</a:t>
             </a:fld>
             <a:endParaRPr lang="fr-CA"/>
           </a:p>
@@ -3569,10 +3569,10 @@
         </p:nvGrpSpPr>
         <p:grpSpPr>
           <a:xfrm>
-            <a:off x="4443086" y="858771"/>
-            <a:ext cx="1835794" cy="2492991"/>
-            <a:chOff x="4530052" y="1065457"/>
-            <a:chExt cx="2011963" cy="2492991"/>
+            <a:off x="4443085" y="858771"/>
+            <a:ext cx="2265965" cy="2492991"/>
+            <a:chOff x="4530050" y="1065457"/>
+            <a:chExt cx="2483414" cy="2492991"/>
           </a:xfrm>
         </p:grpSpPr>
         <p:sp>
@@ -3590,7 +3590,7 @@
           <p:spPr>
             <a:xfrm>
               <a:off x="4530052" y="1065457"/>
-              <a:ext cx="2011961" cy="276999"/>
+              <a:ext cx="2483411" cy="276999"/>
             </a:xfrm>
             <a:prstGeom prst="rect">
               <a:avLst/>
@@ -3631,7 +3631,7 @@
           <p:spPr>
             <a:xfrm>
               <a:off x="4530053" y="1342457"/>
-              <a:ext cx="2011962" cy="1569660"/>
+              <a:ext cx="2483411" cy="1569660"/>
             </a:xfrm>
             <a:prstGeom prst="rect">
               <a:avLst/>
@@ -3657,6 +3657,12 @@
             <a:p>
               <a:r>
                 <a:rPr lang="fr-CA" sz="1200"/>
+                <a:t>search_hyperparameters_range()</a:t>
+              </a:r>
+            </a:p>
+            <a:p>
+              <a:r>
+                <a:rPr lang="fr-CA" sz="1200"/>
                 <a:t>search_hyperparameters()</a:t>
               </a:r>
             </a:p>
@@ -3669,13 +3675,7 @@
             <a:p>
               <a:r>
                 <a:rPr lang="fr-CA" sz="1200"/>
-                <a:t>get_training_accuracy()</a:t>
-              </a:r>
-            </a:p>
-            <a:p>
-              <a:r>
-                <a:rPr lang="fr-CA" sz="1200"/>
-                <a:t>get_testing_accuracy()</a:t>
+                <a:t>get_accuracy()</a:t>
               </a:r>
             </a:p>
             <a:p>
@@ -3712,8 +3712,8 @@
           </p:nvSpPr>
           <p:spPr>
             <a:xfrm>
-              <a:off x="4530052" y="2912117"/>
-              <a:ext cx="2011961" cy="646331"/>
+              <a:off x="4530050" y="2912117"/>
+              <a:ext cx="2483410" cy="646331"/>
             </a:xfrm>
             <a:prstGeom prst="rect">
               <a:avLst/>
@@ -3765,7 +3765,7 @@
         </p:nvGrpSpPr>
         <p:grpSpPr>
           <a:xfrm>
-            <a:off x="8960977" y="547822"/>
+            <a:off x="9304926" y="547822"/>
             <a:ext cx="1729881" cy="1015379"/>
             <a:chOff x="4530052" y="1065457"/>
             <a:chExt cx="2011963" cy="1015379"/>
@@ -3913,7 +3913,7 @@
         </p:nvGrpSpPr>
         <p:grpSpPr>
           <a:xfrm>
-            <a:off x="8973488" y="1680788"/>
+            <a:off x="9317437" y="1680788"/>
             <a:ext cx="1717372" cy="1015379"/>
             <a:chOff x="4530052" y="1065457"/>
             <a:chExt cx="2155417" cy="1015379"/>
@@ -4061,7 +4061,7 @@
         </p:nvGrpSpPr>
         <p:grpSpPr>
           <a:xfrm>
-            <a:off x="8973488" y="2813754"/>
+            <a:off x="9317437" y="2813754"/>
             <a:ext cx="1729879" cy="1015379"/>
             <a:chOff x="4530052" y="1065457"/>
             <a:chExt cx="2011963" cy="1015379"/>
@@ -4209,7 +4209,7 @@
         </p:nvGrpSpPr>
         <p:grpSpPr>
           <a:xfrm>
-            <a:off x="7116937" y="556802"/>
+            <a:off x="7460886" y="556802"/>
             <a:ext cx="1729881" cy="1015379"/>
             <a:chOff x="4530052" y="1065457"/>
             <a:chExt cx="2011963" cy="1015379"/>
@@ -4357,7 +4357,7 @@
         </p:nvGrpSpPr>
         <p:grpSpPr>
           <a:xfrm>
-            <a:off x="7129448" y="1689768"/>
+            <a:off x="7473397" y="1689768"/>
             <a:ext cx="1717372" cy="1015379"/>
             <a:chOff x="4530052" y="1065457"/>
             <a:chExt cx="2155417" cy="1015379"/>
@@ -4505,7 +4505,7 @@
         </p:nvGrpSpPr>
         <p:grpSpPr>
           <a:xfrm>
-            <a:off x="7129448" y="2822734"/>
+            <a:off x="7473397" y="2822734"/>
             <a:ext cx="1729879" cy="1015379"/>
             <a:chOff x="4530052" y="1065457"/>
             <a:chExt cx="2011963" cy="1015379"/>
@@ -4653,7 +4653,7 @@
         </p:nvSpPr>
         <p:spPr>
           <a:xfrm>
-            <a:off x="6790495" y="153439"/>
+            <a:off x="7134444" y="153439"/>
             <a:ext cx="4213860" cy="3950166"/>
           </a:xfrm>
           <a:prstGeom prst="roundRect">
@@ -4705,8 +4705,8 @@
         </p:nvSpPr>
         <p:spPr>
           <a:xfrm>
-            <a:off x="4171946" y="73402"/>
-            <a:ext cx="6976112" cy="4260692"/>
+            <a:off x="4171945" y="73402"/>
+            <a:ext cx="7287413" cy="4260692"/>
           </a:xfrm>
           <a:prstGeom prst="roundRect">
             <a:avLst/>
@@ -4758,9 +4758,9 @@
           <p:nvPr/>
         </p:nvCxnSpPr>
         <p:spPr>
-          <a:xfrm flipV="1">
-            <a:off x="6287036" y="1927528"/>
-            <a:ext cx="511615" cy="984"/>
+          <a:xfrm>
+            <a:off x="6717956" y="1918205"/>
+            <a:ext cx="414896" cy="2396"/>
           </a:xfrm>
           <a:prstGeom prst="straightConnector1">
             <a:avLst/>
@@ -5488,7 +5488,7 @@
         </p:nvSpPr>
         <p:spPr>
           <a:xfrm>
-            <a:off x="8049264" y="181673"/>
+            <a:off x="8393213" y="181673"/>
             <a:ext cx="1729877" cy="369332"/>
           </a:xfrm>
           <a:prstGeom prst="rect">

</xml_diff>